<commit_message>
Add Taller.vpp and update ppt
</commit_message>
<xml_diff>
--- a/PresentaciónFinal.pptx
+++ b/PresentaciónFinal.pptx
@@ -7,13 +7,16 @@
   <p:sldIdLst>
     <p:sldId id="257" r:id="rId2"/>
     <p:sldId id="261" r:id="rId3"/>
-    <p:sldId id="263" r:id="rId4"/>
-    <p:sldId id="264" r:id="rId5"/>
-    <p:sldId id="262" r:id="rId6"/>
-    <p:sldId id="266" r:id="rId7"/>
-    <p:sldId id="267" r:id="rId8"/>
-    <p:sldId id="268" r:id="rId9"/>
-    <p:sldId id="269" r:id="rId10"/>
+    <p:sldId id="270" r:id="rId4"/>
+    <p:sldId id="263" r:id="rId5"/>
+    <p:sldId id="264" r:id="rId6"/>
+    <p:sldId id="262" r:id="rId7"/>
+    <p:sldId id="266" r:id="rId8"/>
+    <p:sldId id="271" r:id="rId9"/>
+    <p:sldId id="267" r:id="rId10"/>
+    <p:sldId id="268" r:id="rId11"/>
+    <p:sldId id="269" r:id="rId12"/>
+    <p:sldId id="272" r:id="rId13"/>
   </p:sldIdLst>
   <p:sldSz cx="9144000" cy="5143500" type="screen16x9"/>
   <p:notesSz cx="6858000" cy="9144000"/>
@@ -119,13 +122,16 @@
           <p14:sldIdLst>
             <p14:sldId id="257"/>
             <p14:sldId id="261"/>
+            <p14:sldId id="270"/>
             <p14:sldId id="263"/>
             <p14:sldId id="264"/>
             <p14:sldId id="262"/>
             <p14:sldId id="266"/>
+            <p14:sldId id="271"/>
             <p14:sldId id="267"/>
             <p14:sldId id="268"/>
             <p14:sldId id="269"/>
+            <p14:sldId id="272"/>
           </p14:sldIdLst>
         </p14:section>
       </p14:sectionLst>
@@ -482,7 +488,7 @@
           <a:p>
             <a:fld id="{50132367-146F-654D-A836-564943EE25C9}" type="datetimeFigureOut">
               <a:rPr lang="en-US" smtClean="0"/>
-              <a:t>12/14/2021</a:t>
+              <a:t>12/16/2021</a:t>
             </a:fld>
             <a:endParaRPr lang="en-US"/>
           </a:p>
@@ -524,7 +530,7 @@
           <a:p>
             <a:fld id="{7D9E8139-6843-764B-A4F4-1F53F9604BBC}" type="slidenum">
               <a:rPr lang="en-US" smtClean="0"/>
-              <a:t>‹Nº›</a:t>
+              <a:t>‹#›</a:t>
             </a:fld>
             <a:endParaRPr lang="en-US"/>
           </a:p>
@@ -652,7 +658,7 @@
           <a:p>
             <a:fld id="{50132367-146F-654D-A836-564943EE25C9}" type="datetimeFigureOut">
               <a:rPr lang="en-US" smtClean="0"/>
-              <a:t>12/14/2021</a:t>
+              <a:t>12/16/2021</a:t>
             </a:fld>
             <a:endParaRPr lang="en-US"/>
           </a:p>
@@ -694,7 +700,7 @@
           <a:p>
             <a:fld id="{7D9E8139-6843-764B-A4F4-1F53F9604BBC}" type="slidenum">
               <a:rPr lang="en-US" smtClean="0"/>
-              <a:t>‹Nº›</a:t>
+              <a:t>‹#›</a:t>
             </a:fld>
             <a:endParaRPr lang="en-US"/>
           </a:p>
@@ -832,7 +838,7 @@
           <a:p>
             <a:fld id="{50132367-146F-654D-A836-564943EE25C9}" type="datetimeFigureOut">
               <a:rPr lang="en-US" smtClean="0"/>
-              <a:t>12/14/2021</a:t>
+              <a:t>12/16/2021</a:t>
             </a:fld>
             <a:endParaRPr lang="en-US"/>
           </a:p>
@@ -874,7 +880,7 @@
           <a:p>
             <a:fld id="{7D9E8139-6843-764B-A4F4-1F53F9604BBC}" type="slidenum">
               <a:rPr lang="en-US" smtClean="0"/>
-              <a:t>‹Nº›</a:t>
+              <a:t>‹#›</a:t>
             </a:fld>
             <a:endParaRPr lang="en-US"/>
           </a:p>
@@ -1002,7 +1008,7 @@
           <a:p>
             <a:fld id="{50132367-146F-654D-A836-564943EE25C9}" type="datetimeFigureOut">
               <a:rPr lang="en-US" smtClean="0"/>
-              <a:t>12/14/2021</a:t>
+              <a:t>12/16/2021</a:t>
             </a:fld>
             <a:endParaRPr lang="en-US"/>
           </a:p>
@@ -1044,7 +1050,7 @@
           <a:p>
             <a:fld id="{7D9E8139-6843-764B-A4F4-1F53F9604BBC}" type="slidenum">
               <a:rPr lang="en-US" smtClean="0"/>
-              <a:t>‹Nº›</a:t>
+              <a:t>‹#›</a:t>
             </a:fld>
             <a:endParaRPr lang="en-US"/>
           </a:p>
@@ -1248,7 +1254,7 @@
           <a:p>
             <a:fld id="{50132367-146F-654D-A836-564943EE25C9}" type="datetimeFigureOut">
               <a:rPr lang="en-US" smtClean="0"/>
-              <a:t>12/14/2021</a:t>
+              <a:t>12/16/2021</a:t>
             </a:fld>
             <a:endParaRPr lang="en-US"/>
           </a:p>
@@ -1290,7 +1296,7 @@
           <a:p>
             <a:fld id="{7D9E8139-6843-764B-A4F4-1F53F9604BBC}" type="slidenum">
               <a:rPr lang="en-US" smtClean="0"/>
-              <a:t>‹Nº›</a:t>
+              <a:t>‹#›</a:t>
             </a:fld>
             <a:endParaRPr lang="en-US"/>
           </a:p>
@@ -1536,7 +1542,7 @@
           <a:p>
             <a:fld id="{50132367-146F-654D-A836-564943EE25C9}" type="datetimeFigureOut">
               <a:rPr lang="en-US" smtClean="0"/>
-              <a:t>12/14/2021</a:t>
+              <a:t>12/16/2021</a:t>
             </a:fld>
             <a:endParaRPr lang="en-US"/>
           </a:p>
@@ -1578,7 +1584,7 @@
           <a:p>
             <a:fld id="{7D9E8139-6843-764B-A4F4-1F53F9604BBC}" type="slidenum">
               <a:rPr lang="en-US" smtClean="0"/>
-              <a:t>‹Nº›</a:t>
+              <a:t>‹#›</a:t>
             </a:fld>
             <a:endParaRPr lang="en-US"/>
           </a:p>
@@ -1963,7 +1969,7 @@
           <a:p>
             <a:fld id="{50132367-146F-654D-A836-564943EE25C9}" type="datetimeFigureOut">
               <a:rPr lang="en-US" smtClean="0"/>
-              <a:t>12/14/2021</a:t>
+              <a:t>12/16/2021</a:t>
             </a:fld>
             <a:endParaRPr lang="en-US"/>
           </a:p>
@@ -2005,7 +2011,7 @@
           <a:p>
             <a:fld id="{7D9E8139-6843-764B-A4F4-1F53F9604BBC}" type="slidenum">
               <a:rPr lang="en-US" smtClean="0"/>
-              <a:t>‹Nº›</a:t>
+              <a:t>‹#›</a:t>
             </a:fld>
             <a:endParaRPr lang="en-US"/>
           </a:p>
@@ -2081,7 +2087,7 @@
           <a:p>
             <a:fld id="{50132367-146F-654D-A836-564943EE25C9}" type="datetimeFigureOut">
               <a:rPr lang="en-US" smtClean="0"/>
-              <a:t>12/14/2021</a:t>
+              <a:t>12/16/2021</a:t>
             </a:fld>
             <a:endParaRPr lang="en-US"/>
           </a:p>
@@ -2123,7 +2129,7 @@
           <a:p>
             <a:fld id="{7D9E8139-6843-764B-A4F4-1F53F9604BBC}" type="slidenum">
               <a:rPr lang="en-US" smtClean="0"/>
-              <a:t>‹Nº›</a:t>
+              <a:t>‹#›</a:t>
             </a:fld>
             <a:endParaRPr lang="en-US"/>
           </a:p>
@@ -2176,7 +2182,7 @@
           <a:p>
             <a:fld id="{50132367-146F-654D-A836-564943EE25C9}" type="datetimeFigureOut">
               <a:rPr lang="en-US" smtClean="0"/>
-              <a:t>12/14/2021</a:t>
+              <a:t>12/16/2021</a:t>
             </a:fld>
             <a:endParaRPr lang="en-US"/>
           </a:p>
@@ -2218,7 +2224,7 @@
           <a:p>
             <a:fld id="{7D9E8139-6843-764B-A4F4-1F53F9604BBC}" type="slidenum">
               <a:rPr lang="en-US" smtClean="0"/>
-              <a:t>‹Nº›</a:t>
+              <a:t>‹#›</a:t>
             </a:fld>
             <a:endParaRPr lang="en-US"/>
           </a:p>
@@ -2453,7 +2459,7 @@
           <a:p>
             <a:fld id="{50132367-146F-654D-A836-564943EE25C9}" type="datetimeFigureOut">
               <a:rPr lang="en-US" smtClean="0"/>
-              <a:t>12/14/2021</a:t>
+              <a:t>12/16/2021</a:t>
             </a:fld>
             <a:endParaRPr lang="en-US"/>
           </a:p>
@@ -2495,7 +2501,7 @@
           <a:p>
             <a:fld id="{7D9E8139-6843-764B-A4F4-1F53F9604BBC}" type="slidenum">
               <a:rPr lang="en-US" smtClean="0"/>
-              <a:t>‹Nº›</a:t>
+              <a:t>‹#›</a:t>
             </a:fld>
             <a:endParaRPr lang="en-US"/>
           </a:p>
@@ -2706,7 +2712,7 @@
           <a:p>
             <a:fld id="{50132367-146F-654D-A836-564943EE25C9}" type="datetimeFigureOut">
               <a:rPr lang="en-US" smtClean="0"/>
-              <a:t>12/14/2021</a:t>
+              <a:t>12/16/2021</a:t>
             </a:fld>
             <a:endParaRPr lang="en-US"/>
           </a:p>
@@ -2748,7 +2754,7 @@
           <a:p>
             <a:fld id="{7D9E8139-6843-764B-A4F4-1F53F9604BBC}" type="slidenum">
               <a:rPr lang="en-US" smtClean="0"/>
-              <a:t>‹Nº›</a:t>
+              <a:t>‹#›</a:t>
             </a:fld>
             <a:endParaRPr lang="en-US"/>
           </a:p>
@@ -2919,7 +2925,7 @@
           <a:p>
             <a:fld id="{50132367-146F-654D-A836-564943EE25C9}" type="datetimeFigureOut">
               <a:rPr lang="en-US" smtClean="0"/>
-              <a:t>12/14/2021</a:t>
+              <a:t>12/16/2021</a:t>
             </a:fld>
             <a:endParaRPr lang="en-US"/>
           </a:p>
@@ -2997,7 +3003,7 @@
           <a:p>
             <a:fld id="{7D9E8139-6843-764B-A4F4-1F53F9604BBC}" type="slidenum">
               <a:rPr lang="en-US" smtClean="0"/>
-              <a:t>‹Nº›</a:t>
+              <a:t>‹#›</a:t>
             </a:fld>
             <a:endParaRPr lang="en-US"/>
           </a:p>
@@ -3399,6 +3405,412 @@
 </p:sld>
 </file>
 
+<file path=ppt/slides/slide10.xml><?xml version="1.0" encoding="utf-8"?>
+<p:sld xmlns:a="http://schemas.openxmlformats.org/drawingml/2006/main" xmlns:r="http://schemas.openxmlformats.org/officeDocument/2006/relationships" xmlns:p="http://schemas.openxmlformats.org/presentationml/2006/main">
+  <p:cSld>
+    <p:bg>
+      <p:bgPr>
+        <a:blipFill rotWithShape="1">
+          <a:blip r:embed="rId2"/>
+          <a:stretch>
+            <a:fillRect/>
+          </a:stretch>
+        </a:blipFill>
+        <a:effectLst/>
+      </p:bgPr>
+    </p:bg>
+    <p:spTree>
+      <p:nvGrpSpPr>
+        <p:cNvPr id="1" name=""/>
+        <p:cNvGrpSpPr/>
+        <p:nvPr/>
+      </p:nvGrpSpPr>
+      <p:grpSpPr>
+        <a:xfrm>
+          <a:off x="0" y="0"/>
+          <a:ext cx="0" cy="0"/>
+          <a:chOff x="0" y="0"/>
+          <a:chExt cx="0" cy="0"/>
+        </a:xfrm>
+      </p:grpSpPr>
+      <p:sp>
+        <p:nvSpPr>
+          <p:cNvPr id="4" name="Content Placeholder 2"/>
+          <p:cNvSpPr>
+            <a:spLocks noGrp="1"/>
+          </p:cNvSpPr>
+          <p:nvPr>
+            <p:ph idx="1"/>
+          </p:nvPr>
+        </p:nvSpPr>
+        <p:spPr>
+          <a:xfrm>
+            <a:off x="495221" y="388239"/>
+            <a:ext cx="7599376" cy="3424914"/>
+          </a:xfrm>
+        </p:spPr>
+        <p:txBody>
+          <a:bodyPr>
+            <a:normAutofit/>
+          </a:bodyPr>
+          <a:lstStyle/>
+          <a:p>
+            <a:pPr marL="0" indent="0" algn="ctr">
+              <a:buNone/>
+            </a:pPr>
+            <a:r>
+              <a:rPr lang="es-ES" dirty="0">
+                <a:latin typeface="Times New Roman" panose="02020603050405020304" pitchFamily="18" charset="0"/>
+                <a:cs typeface="Times New Roman" panose="02020603050405020304" pitchFamily="18" charset="0"/>
+              </a:rPr>
+              <a:t>Creación Imagen Redis</a:t>
+            </a:r>
+          </a:p>
+          <a:p>
+            <a:pPr marL="0" indent="0" algn="ctr">
+              <a:buNone/>
+            </a:pPr>
+            <a:endParaRPr lang="es-ES" sz="1500" dirty="0">
+              <a:latin typeface="Times New Roman" panose="02020603050405020304" pitchFamily="18" charset="0"/>
+              <a:cs typeface="Times New Roman" panose="02020603050405020304" pitchFamily="18" charset="0"/>
+            </a:endParaRPr>
+          </a:p>
+          <a:p>
+            <a:pPr marL="0" indent="0" algn="ctr">
+              <a:buNone/>
+            </a:pPr>
+            <a:r>
+              <a:rPr lang="es-ES" sz="1500" dirty="0">
+                <a:latin typeface="Times New Roman" panose="02020603050405020304" pitchFamily="18" charset="0"/>
+                <a:cs typeface="Times New Roman" panose="02020603050405020304" pitchFamily="18" charset="0"/>
+              </a:rPr>
+              <a:t>Tipo archivo: </a:t>
+            </a:r>
+            <a:r>
+              <a:rPr lang="es-ES" sz="1500" dirty="0" err="1">
+                <a:latin typeface="Times New Roman" panose="02020603050405020304" pitchFamily="18" charset="0"/>
+                <a:cs typeface="Times New Roman" panose="02020603050405020304" pitchFamily="18" charset="0"/>
+              </a:rPr>
+              <a:t>docker-compose.yml</a:t>
+            </a:r>
+            <a:endParaRPr lang="en-US" sz="1500" dirty="0">
+              <a:latin typeface="Times New Roman" panose="02020603050405020304" pitchFamily="18" charset="0"/>
+              <a:cs typeface="Times New Roman" panose="02020603050405020304" pitchFamily="18" charset="0"/>
+            </a:endParaRPr>
+          </a:p>
+        </p:txBody>
+      </p:sp>
+      <p:pic>
+        <p:nvPicPr>
+          <p:cNvPr id="5" name="Imagen 4">
+            <a:extLst>
+              <a:ext uri="{FF2B5EF4-FFF2-40B4-BE49-F238E27FC236}">
+                <a16:creationId xmlns:a16="http://schemas.microsoft.com/office/drawing/2014/main" id="{AD1EC855-FBB1-4269-802B-51318E351B18}"/>
+              </a:ext>
+            </a:extLst>
+          </p:cNvPr>
+          <p:cNvPicPr>
+            <a:picLocks noChangeAspect="1"/>
+          </p:cNvPicPr>
+          <p:nvPr/>
+        </p:nvPicPr>
+        <p:blipFill>
+          <a:blip r:embed="rId3"/>
+          <a:stretch>
+            <a:fillRect/>
+          </a:stretch>
+        </p:blipFill>
+        <p:spPr>
+          <a:xfrm>
+            <a:off x="2452996" y="1697024"/>
+            <a:ext cx="4238007" cy="2688628"/>
+          </a:xfrm>
+          <a:prstGeom prst="rect">
+            <a:avLst/>
+          </a:prstGeom>
+        </p:spPr>
+      </p:pic>
+    </p:spTree>
+    <p:extLst>
+      <p:ext uri="{BB962C8B-B14F-4D97-AF65-F5344CB8AC3E}">
+        <p14:creationId xmlns:p14="http://schemas.microsoft.com/office/powerpoint/2010/main" val="319696611"/>
+      </p:ext>
+    </p:extLst>
+  </p:cSld>
+  <p:clrMapOvr>
+    <a:masterClrMapping/>
+  </p:clrMapOvr>
+</p:sld>
+</file>
+
+<file path=ppt/slides/slide11.xml><?xml version="1.0" encoding="utf-8"?>
+<p:sld xmlns:a="http://schemas.openxmlformats.org/drawingml/2006/main" xmlns:r="http://schemas.openxmlformats.org/officeDocument/2006/relationships" xmlns:p="http://schemas.openxmlformats.org/presentationml/2006/main">
+  <p:cSld>
+    <p:bg>
+      <p:bgPr>
+        <a:blipFill rotWithShape="1">
+          <a:blip r:embed="rId2"/>
+          <a:stretch>
+            <a:fillRect/>
+          </a:stretch>
+        </a:blipFill>
+        <a:effectLst/>
+      </p:bgPr>
+    </p:bg>
+    <p:spTree>
+      <p:nvGrpSpPr>
+        <p:cNvPr id="1" name=""/>
+        <p:cNvGrpSpPr/>
+        <p:nvPr/>
+      </p:nvGrpSpPr>
+      <p:grpSpPr>
+        <a:xfrm>
+          <a:off x="0" y="0"/>
+          <a:ext cx="0" cy="0"/>
+          <a:chOff x="0" y="0"/>
+          <a:chExt cx="0" cy="0"/>
+        </a:xfrm>
+      </p:grpSpPr>
+      <p:sp>
+        <p:nvSpPr>
+          <p:cNvPr id="4" name="Content Placeholder 2"/>
+          <p:cNvSpPr>
+            <a:spLocks noGrp="1"/>
+          </p:cNvSpPr>
+          <p:nvPr>
+            <p:ph idx="1"/>
+          </p:nvPr>
+        </p:nvSpPr>
+        <p:spPr>
+          <a:xfrm>
+            <a:off x="495221" y="654063"/>
+            <a:ext cx="7599376" cy="3424914"/>
+          </a:xfrm>
+        </p:spPr>
+        <p:txBody>
+          <a:bodyPr>
+            <a:normAutofit/>
+          </a:bodyPr>
+          <a:lstStyle/>
+          <a:p>
+            <a:pPr marL="0" indent="0" algn="ctr">
+              <a:buNone/>
+            </a:pPr>
+            <a:r>
+              <a:rPr lang="es-ES" dirty="0">
+                <a:latin typeface="Times New Roman" panose="02020603050405020304" pitchFamily="18" charset="0"/>
+                <a:cs typeface="Times New Roman" panose="02020603050405020304" pitchFamily="18" charset="0"/>
+              </a:rPr>
+              <a:t>Conexión a la Base de datos</a:t>
+            </a:r>
+          </a:p>
+          <a:p>
+            <a:pPr marL="0" indent="0" algn="ctr">
+              <a:buNone/>
+            </a:pPr>
+            <a:endParaRPr lang="es-ES" sz="1500" dirty="0">
+              <a:latin typeface="Times New Roman" panose="02020603050405020304" pitchFamily="18" charset="0"/>
+              <a:cs typeface="Times New Roman" panose="02020603050405020304" pitchFamily="18" charset="0"/>
+            </a:endParaRPr>
+          </a:p>
+        </p:txBody>
+      </p:sp>
+      <p:pic>
+        <p:nvPicPr>
+          <p:cNvPr id="3" name="Imagen 2">
+            <a:extLst>
+              <a:ext uri="{FF2B5EF4-FFF2-40B4-BE49-F238E27FC236}">
+                <a16:creationId xmlns:a16="http://schemas.microsoft.com/office/drawing/2014/main" id="{6EDAF813-D541-4879-87B9-8E31891B6F4D}"/>
+              </a:ext>
+            </a:extLst>
+          </p:cNvPr>
+          <p:cNvPicPr>
+            <a:picLocks noChangeAspect="1"/>
+          </p:cNvPicPr>
+          <p:nvPr/>
+        </p:nvPicPr>
+        <p:blipFill>
+          <a:blip r:embed="rId3"/>
+          <a:stretch>
+            <a:fillRect/>
+          </a:stretch>
+        </p:blipFill>
+        <p:spPr>
+          <a:xfrm>
+            <a:off x="2305305" y="1392203"/>
+            <a:ext cx="3997774" cy="3136465"/>
+          </a:xfrm>
+          <a:prstGeom prst="rect">
+            <a:avLst/>
+          </a:prstGeom>
+        </p:spPr>
+      </p:pic>
+    </p:spTree>
+    <p:extLst>
+      <p:ext uri="{BB962C8B-B14F-4D97-AF65-F5344CB8AC3E}">
+        <p14:creationId xmlns:p14="http://schemas.microsoft.com/office/powerpoint/2010/main" val="1223978356"/>
+      </p:ext>
+    </p:extLst>
+  </p:cSld>
+  <p:clrMapOvr>
+    <a:masterClrMapping/>
+  </p:clrMapOvr>
+</p:sld>
+</file>
+
+<file path=ppt/slides/slide12.xml><?xml version="1.0" encoding="utf-8"?>
+<p:sld xmlns:a="http://schemas.openxmlformats.org/drawingml/2006/main" xmlns:r="http://schemas.openxmlformats.org/officeDocument/2006/relationships" xmlns:p="http://schemas.openxmlformats.org/presentationml/2006/main">
+  <p:cSld>
+    <p:bg>
+      <p:bgPr>
+        <a:blipFill rotWithShape="1">
+          <a:blip r:embed="rId2"/>
+          <a:stretch>
+            <a:fillRect/>
+          </a:stretch>
+        </a:blipFill>
+        <a:effectLst/>
+      </p:bgPr>
+    </p:bg>
+    <p:spTree>
+      <p:nvGrpSpPr>
+        <p:cNvPr id="1" name=""/>
+        <p:cNvGrpSpPr/>
+        <p:nvPr/>
+      </p:nvGrpSpPr>
+      <p:grpSpPr>
+        <a:xfrm>
+          <a:off x="0" y="0"/>
+          <a:ext cx="0" cy="0"/>
+          <a:chOff x="0" y="0"/>
+          <a:chExt cx="0" cy="0"/>
+        </a:xfrm>
+      </p:grpSpPr>
+      <p:sp>
+        <p:nvSpPr>
+          <p:cNvPr id="4" name="Content Placeholder 2"/>
+          <p:cNvSpPr>
+            <a:spLocks noGrp="1"/>
+          </p:cNvSpPr>
+          <p:nvPr>
+            <p:ph idx="1"/>
+          </p:nvPr>
+        </p:nvSpPr>
+        <p:spPr>
+          <a:xfrm>
+            <a:off x="495221" y="654063"/>
+            <a:ext cx="7599376" cy="3424914"/>
+          </a:xfrm>
+        </p:spPr>
+        <p:txBody>
+          <a:bodyPr>
+            <a:normAutofit/>
+          </a:bodyPr>
+          <a:lstStyle/>
+          <a:p>
+            <a:pPr marL="0" indent="0" algn="ctr">
+              <a:buNone/>
+            </a:pPr>
+            <a:r>
+              <a:rPr lang="es-ES" dirty="0">
+                <a:latin typeface="Times New Roman" panose="02020603050405020304" pitchFamily="18" charset="0"/>
+                <a:cs typeface="Times New Roman" panose="02020603050405020304" pitchFamily="18" charset="0"/>
+              </a:rPr>
+              <a:t>Referencias bibliográficas</a:t>
+            </a:r>
+          </a:p>
+          <a:p>
+            <a:pPr marL="0" indent="0" algn="ctr">
+              <a:buNone/>
+            </a:pPr>
+            <a:endParaRPr lang="es-ES" sz="1500" dirty="0">
+              <a:latin typeface="Times New Roman" panose="02020603050405020304" pitchFamily="18" charset="0"/>
+              <a:cs typeface="Times New Roman" panose="02020603050405020304" pitchFamily="18" charset="0"/>
+            </a:endParaRPr>
+          </a:p>
+        </p:txBody>
+      </p:sp>
+      <p:sp>
+        <p:nvSpPr>
+          <p:cNvPr id="5" name="TextBox 4">
+            <a:extLst>
+              <a:ext uri="{FF2B5EF4-FFF2-40B4-BE49-F238E27FC236}">
+                <a16:creationId xmlns:a16="http://schemas.microsoft.com/office/drawing/2014/main" id="{1F500B23-70C4-498E-B73C-A9C2ACAA4624}"/>
+              </a:ext>
+            </a:extLst>
+          </p:cNvPr>
+          <p:cNvSpPr txBox="1"/>
+          <p:nvPr/>
+        </p:nvSpPr>
+        <p:spPr>
+          <a:xfrm>
+            <a:off x="715598" y="1925419"/>
+            <a:ext cx="7405458" cy="2308324"/>
+          </a:xfrm>
+          <a:prstGeom prst="rect">
+            <a:avLst/>
+          </a:prstGeom>
+          <a:noFill/>
+        </p:spPr>
+        <p:txBody>
+          <a:bodyPr wrap="square">
+            <a:spAutoFit/>
+          </a:bodyPr>
+          <a:lstStyle/>
+          <a:p>
+            <a:r>
+              <a:rPr lang="en-US" dirty="0">
+                <a:hlinkClick r:id="rId3"/>
+              </a:rPr>
+              <a:t>https://www.paradigmadigital.com/dev/cassandra-la-dama-de-las-bases-de-datos-nosql/</a:t>
+            </a:r>
+            <a:endParaRPr lang="en-US" dirty="0"/>
+          </a:p>
+          <a:p>
+            <a:endParaRPr lang="en-US" dirty="0"/>
+          </a:p>
+          <a:p>
+            <a:r>
+              <a:rPr lang="en-US" dirty="0">
+                <a:hlinkClick r:id="rId4"/>
+              </a:rPr>
+              <a:t>https://es.wikipedia.org/wiki/Redis</a:t>
+            </a:r>
+            <a:endParaRPr lang="en-US" dirty="0"/>
+          </a:p>
+          <a:p>
+            <a:endParaRPr lang="en-US" dirty="0"/>
+          </a:p>
+          <a:p>
+            <a:r>
+              <a:rPr lang="en-US" dirty="0">
+                <a:hlinkClick r:id="rId5"/>
+              </a:rPr>
+              <a:t>https://blog.bi-geek.com/redis-para-principiantes/</a:t>
+            </a:r>
+            <a:endParaRPr lang="en-US" dirty="0"/>
+          </a:p>
+          <a:p>
+            <a:endParaRPr lang="en-US" dirty="0"/>
+          </a:p>
+          <a:p>
+            <a:endParaRPr lang="en-US" dirty="0"/>
+          </a:p>
+        </p:txBody>
+      </p:sp>
+    </p:spTree>
+    <p:extLst>
+      <p:ext uri="{BB962C8B-B14F-4D97-AF65-F5344CB8AC3E}">
+        <p14:creationId xmlns:p14="http://schemas.microsoft.com/office/powerpoint/2010/main" val="944070511"/>
+      </p:ext>
+    </p:extLst>
+  </p:cSld>
+  <p:clrMapOvr>
+    <a:masterClrMapping/>
+  </p:clrMapOvr>
+</p:sld>
+</file>
+
 <file path=ppt/slides/slide2.xml><?xml version="1.0" encoding="utf-8"?>
 <p:sld xmlns:a="http://schemas.openxmlformats.org/drawingml/2006/main" xmlns:r="http://schemas.openxmlformats.org/officeDocument/2006/relationships" xmlns:p="http://schemas.openxmlformats.org/presentationml/2006/main">
   <p:cSld>
@@ -3589,56 +4001,90 @@
         </p:nvSpPr>
         <p:spPr>
           <a:xfrm>
-            <a:off x="858824" y="1016110"/>
-            <a:ext cx="7426352" cy="2472212"/>
+            <a:off x="1785653" y="2176639"/>
+            <a:ext cx="5572694" cy="1301231"/>
           </a:xfrm>
         </p:spPr>
         <p:txBody>
           <a:bodyPr>
-            <a:normAutofit/>
+            <a:noAutofit/>
           </a:bodyPr>
           <a:lstStyle/>
           <a:p>
-            <a:pPr marL="0" indent="0" algn="ctr">
-              <a:buNone/>
-            </a:pPr>
-            <a:r>
-              <a:rPr lang="en-US" b="1" dirty="0">
-                <a:latin typeface="Times New Roman" panose="02020603050405020304" pitchFamily="18" charset="0"/>
-                <a:cs typeface="Times New Roman" panose="02020603050405020304" pitchFamily="18" charset="0"/>
-              </a:rPr>
-              <a:t>¿Que es Cassandra?</a:t>
-            </a:r>
-          </a:p>
-          <a:p>
-            <a:pPr marL="0" indent="0" algn="just">
-              <a:buNone/>
-            </a:pPr>
-            <a:r>
-              <a:rPr lang="es-MX" sz="1500" dirty="0" err="1">
+            <a:r>
+              <a:rPr lang="es-CO" sz="2200" dirty="0" err="1">
                 <a:latin typeface="Times New Roman" panose="02020603050405020304" pitchFamily="18" charset="0"/>
                 <a:cs typeface="Times New Roman" panose="02020603050405020304" pitchFamily="18" charset="0"/>
               </a:rPr>
               <a:t>Cassandra</a:t>
             </a:r>
-            <a:r>
-              <a:rPr lang="es-MX" sz="1500" dirty="0">
-                <a:latin typeface="Times New Roman" panose="02020603050405020304" pitchFamily="18" charset="0"/>
-                <a:cs typeface="Times New Roman" panose="02020603050405020304" pitchFamily="18" charset="0"/>
-              </a:rPr>
-              <a:t> se define como una base de datos NoSQL distribuida y masivamente escalable, y esta es su mayor virtud desde nuestro punto de vista, la capacidad de escalar linealmente.</a:t>
-            </a:r>
-            <a:endParaRPr lang="en-US" sz="1500" dirty="0">
+            <a:endParaRPr lang="es-CO" sz="2200" dirty="0">
               <a:latin typeface="Times New Roman" panose="02020603050405020304" pitchFamily="18" charset="0"/>
               <a:cs typeface="Times New Roman" panose="02020603050405020304" pitchFamily="18" charset="0"/>
             </a:endParaRPr>
           </a:p>
+          <a:p>
+            <a:r>
+              <a:rPr lang="es-CO" sz="2200" dirty="0">
+                <a:latin typeface="Times New Roman" panose="02020603050405020304" pitchFamily="18" charset="0"/>
+                <a:cs typeface="Times New Roman" panose="02020603050405020304" pitchFamily="18" charset="0"/>
+              </a:rPr>
+              <a:t>Redis</a:t>
+            </a:r>
+          </a:p>
+          <a:p>
+            <a:r>
+              <a:rPr lang="es-CO" sz="2200" dirty="0">
+                <a:latin typeface="Times New Roman" panose="02020603050405020304" pitchFamily="18" charset="0"/>
+                <a:cs typeface="Times New Roman" panose="02020603050405020304" pitchFamily="18" charset="0"/>
+              </a:rPr>
+              <a:t>Ejemplos prácticos</a:t>
+            </a:r>
+          </a:p>
+        </p:txBody>
+      </p:sp>
+      <p:sp>
+        <p:nvSpPr>
+          <p:cNvPr id="2" name="CuadroTexto 1">
+            <a:extLst>
+              <a:ext uri="{FF2B5EF4-FFF2-40B4-BE49-F238E27FC236}">
+                <a16:creationId xmlns:a16="http://schemas.microsoft.com/office/drawing/2014/main" id="{B31B1D1A-1E8C-4770-B3E2-2443377F6D6B}"/>
+              </a:ext>
+            </a:extLst>
+          </p:cNvPr>
+          <p:cNvSpPr txBox="1"/>
+          <p:nvPr/>
+        </p:nvSpPr>
+        <p:spPr>
+          <a:xfrm>
+            <a:off x="1894905" y="1188933"/>
+            <a:ext cx="1462260" cy="584775"/>
+          </a:xfrm>
+          <a:prstGeom prst="rect">
+            <a:avLst/>
+          </a:prstGeom>
+          <a:noFill/>
+        </p:spPr>
+        <p:txBody>
+          <a:bodyPr wrap="none" rtlCol="0">
+            <a:spAutoFit/>
+          </a:bodyPr>
+          <a:lstStyle/>
+          <a:p>
+            <a:r>
+              <a:rPr lang="es-CO" sz="3200" dirty="0">
+                <a:latin typeface="Times New Roman" panose="02020603050405020304" pitchFamily="18" charset="0"/>
+                <a:cs typeface="Times New Roman" panose="02020603050405020304" pitchFamily="18" charset="0"/>
+              </a:rPr>
+              <a:t>Agenda</a:t>
+            </a:r>
+          </a:p>
         </p:txBody>
       </p:sp>
     </p:spTree>
     <p:extLst>
       <p:ext uri="{BB962C8B-B14F-4D97-AF65-F5344CB8AC3E}">
-        <p14:creationId xmlns:p14="http://schemas.microsoft.com/office/powerpoint/2010/main" val="460351598"/>
+        <p14:creationId xmlns:p14="http://schemas.microsoft.com/office/powerpoint/2010/main" val="1119061851"/>
       </p:ext>
     </p:extLst>
   </p:cSld>
@@ -3688,13 +4134,13 @@
         </p:nvSpPr>
         <p:spPr>
           <a:xfrm>
-            <a:off x="1095891" y="1038798"/>
+            <a:off x="858824" y="1016110"/>
             <a:ext cx="7426352" cy="2472212"/>
           </a:xfrm>
         </p:spPr>
         <p:txBody>
           <a:bodyPr>
-            <a:normAutofit fontScale="25000" lnSpcReduction="20000"/>
+            <a:normAutofit/>
           </a:bodyPr>
           <a:lstStyle/>
           <a:p>
@@ -3702,206 +4148,60 @@
               <a:buNone/>
             </a:pPr>
             <a:r>
-              <a:rPr lang="en-US" sz="12800" b="1" dirty="0">
-                <a:latin typeface="Times New Roman" panose="02020603050405020304" pitchFamily="18" charset="0"/>
-                <a:cs typeface="Times New Roman" panose="02020603050405020304" pitchFamily="18" charset="0"/>
-              </a:rPr>
-              <a:t>¿</a:t>
-            </a:r>
-            <a:r>
-              <a:rPr lang="en-US" sz="12800" b="1" dirty="0" err="1">
-                <a:latin typeface="Times New Roman" panose="02020603050405020304" pitchFamily="18" charset="0"/>
-                <a:cs typeface="Times New Roman" panose="02020603050405020304" pitchFamily="18" charset="0"/>
-              </a:rPr>
-              <a:t>Cuando</a:t>
-            </a:r>
-            <a:r>
-              <a:rPr lang="en-US" sz="12800" b="1" dirty="0">
-                <a:latin typeface="Times New Roman" panose="02020603050405020304" pitchFamily="18" charset="0"/>
-                <a:cs typeface="Times New Roman" panose="02020603050405020304" pitchFamily="18" charset="0"/>
-              </a:rPr>
-              <a:t> usar </a:t>
-            </a:r>
-            <a:r>
-              <a:rPr lang="en-US" sz="12800" b="1" dirty="0" err="1">
-                <a:latin typeface="Times New Roman" panose="02020603050405020304" pitchFamily="18" charset="0"/>
-                <a:cs typeface="Times New Roman" panose="02020603050405020304" pitchFamily="18" charset="0"/>
-              </a:rPr>
-              <a:t>cassandra</a:t>
-            </a:r>
-            <a:r>
-              <a:rPr lang="en-US" sz="12800" b="1" dirty="0">
-                <a:latin typeface="Times New Roman" panose="02020603050405020304" pitchFamily="18" charset="0"/>
-                <a:cs typeface="Times New Roman" panose="02020603050405020304" pitchFamily="18" charset="0"/>
-              </a:rPr>
-              <a:t>?</a:t>
+              <a:rPr lang="en-US" b="1" dirty="0">
+                <a:latin typeface="Times New Roman" panose="02020603050405020304" pitchFamily="18" charset="0"/>
+                <a:cs typeface="Times New Roman" panose="02020603050405020304" pitchFamily="18" charset="0"/>
+              </a:rPr>
+              <a:t>¿Que es Cassandra?</a:t>
             </a:r>
           </a:p>
           <a:p>
             <a:pPr marL="0" indent="0" algn="just">
               <a:buNone/>
             </a:pPr>
-            <a:r>
-              <a:rPr lang="es-MX" sz="6000" dirty="0">
-                <a:latin typeface="Times New Roman" panose="02020603050405020304" pitchFamily="18" charset="0"/>
-                <a:cs typeface="Times New Roman" panose="02020603050405020304" pitchFamily="18" charset="0"/>
-              </a:rPr>
-              <a:t>Cuando cumplamos con los siguientes puntos será un buen momento para plantearnos </a:t>
-            </a:r>
-            <a:r>
-              <a:rPr lang="es-MX" sz="6000" dirty="0" err="1">
-                <a:latin typeface="Times New Roman" panose="02020603050405020304" pitchFamily="18" charset="0"/>
-                <a:cs typeface="Times New Roman" panose="02020603050405020304" pitchFamily="18" charset="0"/>
-              </a:rPr>
-              <a:t>Cassandra</a:t>
-            </a:r>
-            <a:r>
-              <a:rPr lang="es-MX" sz="6000" dirty="0">
-                <a:latin typeface="Times New Roman" panose="02020603050405020304" pitchFamily="18" charset="0"/>
-                <a:cs typeface="Times New Roman" panose="02020603050405020304" pitchFamily="18" charset="0"/>
-              </a:rPr>
-              <a:t>:</a:t>
-            </a:r>
-          </a:p>
-          <a:p>
-            <a:pPr marL="0" indent="0" algn="just">
-              <a:buNone/>
-            </a:pPr>
-            <a:endParaRPr lang="es-MX" sz="6000" dirty="0">
+            <a:endParaRPr lang="es-MX" sz="1500" dirty="0">
               <a:latin typeface="Times New Roman" panose="02020603050405020304" pitchFamily="18" charset="0"/>
               <a:cs typeface="Times New Roman" panose="02020603050405020304" pitchFamily="18" charset="0"/>
             </a:endParaRPr>
           </a:p>
           <a:p>
-            <a:pPr algn="just"/>
-            <a:r>
-              <a:rPr lang="es-MX" sz="6000" dirty="0">
-                <a:latin typeface="Times New Roman" panose="02020603050405020304" pitchFamily="18" charset="0"/>
-                <a:cs typeface="Times New Roman" panose="02020603050405020304" pitchFamily="18" charset="0"/>
-              </a:rPr>
-              <a:t>Como hemos comentado, las escrituras son muy rápidas, por lo que cuando tengamos un gran número de escrituras que supere las lecturas será buen momento para empezar a pensar en </a:t>
-            </a:r>
-            <a:r>
-              <a:rPr lang="es-MX" sz="6000" dirty="0" err="1">
-                <a:latin typeface="Times New Roman" panose="02020603050405020304" pitchFamily="18" charset="0"/>
-                <a:cs typeface="Times New Roman" panose="02020603050405020304" pitchFamily="18" charset="0"/>
-              </a:rPr>
-              <a:t>Cassandra</a:t>
-            </a:r>
-            <a:r>
-              <a:rPr lang="es-MX" sz="6000" dirty="0">
-                <a:latin typeface="Times New Roman" panose="02020603050405020304" pitchFamily="18" charset="0"/>
-                <a:cs typeface="Times New Roman" panose="02020603050405020304" pitchFamily="18" charset="0"/>
-              </a:rPr>
-              <a:t>.</a:t>
-            </a:r>
-          </a:p>
-          <a:p>
-            <a:pPr algn="just"/>
-            <a:r>
-              <a:rPr lang="es-MX" sz="6000" dirty="0">
-                <a:latin typeface="Times New Roman" panose="02020603050405020304" pitchFamily="18" charset="0"/>
-                <a:cs typeface="Times New Roman" panose="02020603050405020304" pitchFamily="18" charset="0"/>
-              </a:rPr>
-              <a:t>Si la lectura es realizada a través de una </a:t>
-            </a:r>
-            <a:r>
-              <a:rPr lang="es-MX" sz="6000" dirty="0" err="1">
-                <a:latin typeface="Times New Roman" panose="02020603050405020304" pitchFamily="18" charset="0"/>
-                <a:cs typeface="Times New Roman" panose="02020603050405020304" pitchFamily="18" charset="0"/>
-              </a:rPr>
-              <a:t>primary</a:t>
-            </a:r>
-            <a:r>
-              <a:rPr lang="es-MX" sz="6000" dirty="0">
-                <a:latin typeface="Times New Roman" panose="02020603050405020304" pitchFamily="18" charset="0"/>
-                <a:cs typeface="Times New Roman" panose="02020603050405020304" pitchFamily="18" charset="0"/>
-              </a:rPr>
-              <a:t> </a:t>
-            </a:r>
-            <a:r>
-              <a:rPr lang="es-MX" sz="6000" dirty="0" err="1">
-                <a:latin typeface="Times New Roman" panose="02020603050405020304" pitchFamily="18" charset="0"/>
-                <a:cs typeface="Times New Roman" panose="02020603050405020304" pitchFamily="18" charset="0"/>
-              </a:rPr>
-              <a:t>key</a:t>
-            </a:r>
-            <a:r>
-              <a:rPr lang="es-MX" sz="6000" dirty="0">
-                <a:latin typeface="Times New Roman" panose="02020603050405020304" pitchFamily="18" charset="0"/>
-                <a:cs typeface="Times New Roman" panose="02020603050405020304" pitchFamily="18" charset="0"/>
-              </a:rPr>
-              <a:t>, ya que de otro modo la lectura será muy penalizada.</a:t>
-            </a:r>
-          </a:p>
-          <a:p>
-            <a:pPr algn="just"/>
-            <a:r>
-              <a:rPr lang="es-MX" sz="6000" dirty="0">
-                <a:latin typeface="Times New Roman" panose="02020603050405020304" pitchFamily="18" charset="0"/>
-                <a:cs typeface="Times New Roman" panose="02020603050405020304" pitchFamily="18" charset="0"/>
-              </a:rPr>
-              <a:t>En el caso en el que necesitemos guardar datos de una manera flexible, es decir, no teniendo todos los campos de nuestra </a:t>
-            </a:r>
-            <a:r>
-              <a:rPr lang="es-MX" sz="6000" dirty="0" err="1">
-                <a:latin typeface="Times New Roman" panose="02020603050405020304" pitchFamily="18" charset="0"/>
-                <a:cs typeface="Times New Roman" panose="02020603050405020304" pitchFamily="18" charset="0"/>
-              </a:rPr>
-              <a:t>escturctura</a:t>
-            </a:r>
-            <a:r>
-              <a:rPr lang="es-MX" sz="6000" dirty="0">
-                <a:latin typeface="Times New Roman" panose="02020603050405020304" pitchFamily="18" charset="0"/>
-                <a:cs typeface="Times New Roman" panose="02020603050405020304" pitchFamily="18" charset="0"/>
-              </a:rPr>
-              <a:t>.</a:t>
-            </a:r>
-          </a:p>
-          <a:p>
-            <a:pPr algn="just"/>
-            <a:r>
-              <a:rPr lang="es-MX" sz="6000" dirty="0">
-                <a:latin typeface="Times New Roman" panose="02020603050405020304" pitchFamily="18" charset="0"/>
-                <a:cs typeface="Times New Roman" panose="02020603050405020304" pitchFamily="18" charset="0"/>
-              </a:rPr>
-              <a:t>Siempre y cuando no pensemos en realizar </a:t>
-            </a:r>
-            <a:r>
-              <a:rPr lang="es-MX" sz="6000" dirty="0" err="1">
-                <a:latin typeface="Times New Roman" panose="02020603050405020304" pitchFamily="18" charset="0"/>
-                <a:cs typeface="Times New Roman" panose="02020603050405020304" pitchFamily="18" charset="0"/>
-              </a:rPr>
-              <a:t>joins</a:t>
-            </a:r>
-            <a:r>
-              <a:rPr lang="es-MX" sz="6000" dirty="0">
-                <a:latin typeface="Times New Roman" panose="02020603050405020304" pitchFamily="18" charset="0"/>
-                <a:cs typeface="Times New Roman" panose="02020603050405020304" pitchFamily="18" charset="0"/>
-              </a:rPr>
-              <a:t>.</a:t>
-            </a:r>
-          </a:p>
-          <a:p>
-            <a:pPr algn="just"/>
-            <a:r>
-              <a:rPr lang="es-MX" sz="6000" dirty="0">
-                <a:latin typeface="Times New Roman" panose="02020603050405020304" pitchFamily="18" charset="0"/>
-                <a:cs typeface="Times New Roman" panose="02020603050405020304" pitchFamily="18" charset="0"/>
-              </a:rPr>
-              <a:t>Cuando la información sea actualizada de manera idempotente.</a:t>
-            </a:r>
-            <a:endParaRPr lang="en-US" sz="6000" dirty="0">
+            <a:pPr marL="0" indent="0" algn="just">
+              <a:buNone/>
+            </a:pPr>
+            <a:endParaRPr lang="es-MX" sz="1500" dirty="0">
               <a:latin typeface="Times New Roman" panose="02020603050405020304" pitchFamily="18" charset="0"/>
               <a:cs typeface="Times New Roman" panose="02020603050405020304" pitchFamily="18" charset="0"/>
             </a:endParaRPr>
           </a:p>
+          <a:p>
+            <a:pPr marL="0" indent="0" algn="just">
+              <a:buNone/>
+            </a:pPr>
+            <a:r>
+              <a:rPr lang="es-MX" sz="1500" dirty="0" err="1">
+                <a:latin typeface="Times New Roman" panose="02020603050405020304" pitchFamily="18" charset="0"/>
+                <a:cs typeface="Times New Roman" panose="02020603050405020304" pitchFamily="18" charset="0"/>
+              </a:rPr>
+              <a:t>Cassandra</a:t>
+            </a:r>
+            <a:r>
+              <a:rPr lang="es-MX" sz="1500" dirty="0">
+                <a:latin typeface="Times New Roman" panose="02020603050405020304" pitchFamily="18" charset="0"/>
+                <a:cs typeface="Times New Roman" panose="02020603050405020304" pitchFamily="18" charset="0"/>
+              </a:rPr>
+              <a:t> se define como una base de datos NoSQL distribuida y masivamente escalable, y esta es su mayor virtud desde nuestro punto de vista, la capacidad de escalar linealmente.</a:t>
+            </a:r>
+            <a:endParaRPr lang="en-US" sz="1500" dirty="0">
+              <a:latin typeface="Times New Roman" panose="02020603050405020304" pitchFamily="18" charset="0"/>
+              <a:cs typeface="Times New Roman" panose="02020603050405020304" pitchFamily="18" charset="0"/>
+            </a:endParaRPr>
+          </a:p>
         </p:txBody>
       </p:sp>
     </p:spTree>
     <p:extLst>
       <p:ext uri="{BB962C8B-B14F-4D97-AF65-F5344CB8AC3E}">
-        <p14:creationId xmlns:p14="http://schemas.microsoft.com/office/powerpoint/2010/main" val="3862649840"/>
+        <p14:creationId xmlns:p14="http://schemas.microsoft.com/office/powerpoint/2010/main" val="460351598"/>
       </p:ext>
     </p:extLst>
   </p:cSld>
@@ -3951,47 +4251,229 @@
         </p:nvSpPr>
         <p:spPr>
           <a:xfrm>
-            <a:off x="858824" y="1016110"/>
+            <a:off x="1095891" y="1038798"/>
             <a:ext cx="7426352" cy="2472212"/>
           </a:xfrm>
         </p:spPr>
         <p:txBody>
-          <a:bodyPr/>
+          <a:bodyPr>
+            <a:normAutofit fontScale="25000" lnSpcReduction="20000"/>
+          </a:bodyPr>
           <a:lstStyle/>
           <a:p>
             <a:pPr marL="0" indent="0" algn="ctr">
               <a:buNone/>
             </a:pPr>
             <a:r>
-              <a:rPr lang="en-US" b="1" dirty="0">
-                <a:latin typeface="Times New Roman" panose="02020603050405020304" pitchFamily="18" charset="0"/>
-                <a:cs typeface="Times New Roman" panose="02020603050405020304" pitchFamily="18" charset="0"/>
-              </a:rPr>
-              <a:t>¿Que es Redis?</a:t>
-            </a:r>
-          </a:p>
-          <a:p>
-            <a:pPr marL="0" indent="0">
+              <a:rPr lang="en-US" sz="12800" b="1" dirty="0">
+                <a:latin typeface="Times New Roman" panose="02020603050405020304" pitchFamily="18" charset="0"/>
+                <a:cs typeface="Times New Roman" panose="02020603050405020304" pitchFamily="18" charset="0"/>
+              </a:rPr>
+              <a:t>¿</a:t>
+            </a:r>
+            <a:r>
+              <a:rPr lang="en-US" sz="12800" b="1" dirty="0" err="1">
+                <a:latin typeface="Times New Roman" panose="02020603050405020304" pitchFamily="18" charset="0"/>
+                <a:cs typeface="Times New Roman" panose="02020603050405020304" pitchFamily="18" charset="0"/>
+              </a:rPr>
+              <a:t>Cuando</a:t>
+            </a:r>
+            <a:r>
+              <a:rPr lang="en-US" sz="12800" b="1" dirty="0">
+                <a:latin typeface="Times New Roman" panose="02020603050405020304" pitchFamily="18" charset="0"/>
+                <a:cs typeface="Times New Roman" panose="02020603050405020304" pitchFamily="18" charset="0"/>
+              </a:rPr>
+              <a:t> usar </a:t>
+            </a:r>
+            <a:r>
+              <a:rPr lang="en-US" sz="12800" b="1" dirty="0" err="1">
+                <a:latin typeface="Times New Roman" panose="02020603050405020304" pitchFamily="18" charset="0"/>
+                <a:cs typeface="Times New Roman" panose="02020603050405020304" pitchFamily="18" charset="0"/>
+              </a:rPr>
+              <a:t>cassandra</a:t>
+            </a:r>
+            <a:r>
+              <a:rPr lang="en-US" sz="12800" b="1" dirty="0">
+                <a:latin typeface="Times New Roman" panose="02020603050405020304" pitchFamily="18" charset="0"/>
+                <a:cs typeface="Times New Roman" panose="02020603050405020304" pitchFamily="18" charset="0"/>
+              </a:rPr>
+              <a:t>?</a:t>
+            </a:r>
+          </a:p>
+          <a:p>
+            <a:pPr marL="0" indent="0" algn="just">
               <a:buNone/>
             </a:pPr>
-            <a:r>
-              <a:rPr lang="es-MX" sz="1500" dirty="0">
-                <a:latin typeface="Times New Roman" panose="02020603050405020304" pitchFamily="18" charset="0"/>
-                <a:cs typeface="Times New Roman" panose="02020603050405020304" pitchFamily="18" charset="0"/>
-              </a:rPr>
-              <a:t>Redis es un motor de base de datos en memoria, basado en el almacenamiento en tablas de hashes (clave/valor) pero que opcionalmente puede ser usada como una base de datos durable o persistente.</a:t>
-            </a:r>
-            <a:endParaRPr lang="en-US" sz="1500" dirty="0">
+            <a:endParaRPr lang="es-MX" sz="6000" dirty="0">
               <a:latin typeface="Times New Roman" panose="02020603050405020304" pitchFamily="18" charset="0"/>
               <a:cs typeface="Times New Roman" panose="02020603050405020304" pitchFamily="18" charset="0"/>
             </a:endParaRPr>
           </a:p>
+          <a:p>
+            <a:pPr marL="0" indent="0" algn="just">
+              <a:buNone/>
+            </a:pPr>
+            <a:r>
+              <a:rPr lang="es-MX" sz="6000" dirty="0">
+                <a:latin typeface="Times New Roman" panose="02020603050405020304" pitchFamily="18" charset="0"/>
+                <a:cs typeface="Times New Roman" panose="02020603050405020304" pitchFamily="18" charset="0"/>
+              </a:rPr>
+              <a:t>Cuando cumplamos con los siguientes puntos será un buen momento para plantearnos </a:t>
+            </a:r>
+            <a:r>
+              <a:rPr lang="es-MX" sz="6000" dirty="0" err="1">
+                <a:latin typeface="Times New Roman" panose="02020603050405020304" pitchFamily="18" charset="0"/>
+                <a:cs typeface="Times New Roman" panose="02020603050405020304" pitchFamily="18" charset="0"/>
+              </a:rPr>
+              <a:t>Cassandra</a:t>
+            </a:r>
+            <a:r>
+              <a:rPr lang="es-MX" sz="6000" dirty="0">
+                <a:latin typeface="Times New Roman" panose="02020603050405020304" pitchFamily="18" charset="0"/>
+                <a:cs typeface="Times New Roman" panose="02020603050405020304" pitchFamily="18" charset="0"/>
+              </a:rPr>
+              <a:t>:</a:t>
+            </a:r>
+          </a:p>
+          <a:p>
+            <a:pPr marL="0" indent="0" algn="just">
+              <a:buNone/>
+            </a:pPr>
+            <a:endParaRPr lang="es-MX" sz="6000" dirty="0">
+              <a:latin typeface="Times New Roman" panose="02020603050405020304" pitchFamily="18" charset="0"/>
+              <a:cs typeface="Times New Roman" panose="02020603050405020304" pitchFamily="18" charset="0"/>
+            </a:endParaRPr>
+          </a:p>
+          <a:p>
+            <a:pPr algn="just"/>
+            <a:r>
+              <a:rPr lang="es-MX" sz="6000" dirty="0">
+                <a:latin typeface="Times New Roman" panose="02020603050405020304" pitchFamily="18" charset="0"/>
+                <a:cs typeface="Times New Roman" panose="02020603050405020304" pitchFamily="18" charset="0"/>
+              </a:rPr>
+              <a:t>Como hemos comentado, las escrituras son muy rápidas, por lo que cuando tengamos un gran número de escrituras que supere las lecturas será buen momento para empezar a pensar en </a:t>
+            </a:r>
+            <a:r>
+              <a:rPr lang="es-MX" sz="6000" dirty="0" err="1">
+                <a:latin typeface="Times New Roman" panose="02020603050405020304" pitchFamily="18" charset="0"/>
+                <a:cs typeface="Times New Roman" panose="02020603050405020304" pitchFamily="18" charset="0"/>
+              </a:rPr>
+              <a:t>Cassandra</a:t>
+            </a:r>
+            <a:r>
+              <a:rPr lang="es-MX" sz="6000" dirty="0">
+                <a:latin typeface="Times New Roman" panose="02020603050405020304" pitchFamily="18" charset="0"/>
+                <a:cs typeface="Times New Roman" panose="02020603050405020304" pitchFamily="18" charset="0"/>
+              </a:rPr>
+              <a:t>.</a:t>
+            </a:r>
+          </a:p>
+          <a:p>
+            <a:pPr algn="just"/>
+            <a:r>
+              <a:rPr lang="es-MX" sz="6000" dirty="0">
+                <a:latin typeface="Times New Roman" panose="02020603050405020304" pitchFamily="18" charset="0"/>
+                <a:cs typeface="Times New Roman" panose="02020603050405020304" pitchFamily="18" charset="0"/>
+              </a:rPr>
+              <a:t>Si la lectura es realizada a través de una </a:t>
+            </a:r>
+            <a:r>
+              <a:rPr lang="es-MX" sz="6000" dirty="0" err="1">
+                <a:latin typeface="Times New Roman" panose="02020603050405020304" pitchFamily="18" charset="0"/>
+                <a:cs typeface="Times New Roman" panose="02020603050405020304" pitchFamily="18" charset="0"/>
+              </a:rPr>
+              <a:t>primary</a:t>
+            </a:r>
+            <a:r>
+              <a:rPr lang="es-MX" sz="6000" dirty="0">
+                <a:latin typeface="Times New Roman" panose="02020603050405020304" pitchFamily="18" charset="0"/>
+                <a:cs typeface="Times New Roman" panose="02020603050405020304" pitchFamily="18" charset="0"/>
+              </a:rPr>
+              <a:t> </a:t>
+            </a:r>
+            <a:r>
+              <a:rPr lang="es-MX" sz="6000" dirty="0" err="1">
+                <a:latin typeface="Times New Roman" panose="02020603050405020304" pitchFamily="18" charset="0"/>
+                <a:cs typeface="Times New Roman" panose="02020603050405020304" pitchFamily="18" charset="0"/>
+              </a:rPr>
+              <a:t>key</a:t>
+            </a:r>
+            <a:r>
+              <a:rPr lang="es-MX" sz="6000" dirty="0">
+                <a:latin typeface="Times New Roman" panose="02020603050405020304" pitchFamily="18" charset="0"/>
+                <a:cs typeface="Times New Roman" panose="02020603050405020304" pitchFamily="18" charset="0"/>
+              </a:rPr>
+              <a:t>, ya que de otro modo la lectura será muy penalizada.</a:t>
+            </a:r>
+          </a:p>
+          <a:p>
+            <a:pPr algn="just"/>
+            <a:r>
+              <a:rPr lang="es-MX" sz="6000" dirty="0">
+                <a:latin typeface="Times New Roman" panose="02020603050405020304" pitchFamily="18" charset="0"/>
+                <a:cs typeface="Times New Roman" panose="02020603050405020304" pitchFamily="18" charset="0"/>
+              </a:rPr>
+              <a:t>En el caso en el que necesitemos guardar datos de una manera flexible, es decir, no teniendo todos los campos de nuestra </a:t>
+            </a:r>
+            <a:r>
+              <a:rPr lang="es-MX" sz="6000" dirty="0" err="1">
+                <a:latin typeface="Times New Roman" panose="02020603050405020304" pitchFamily="18" charset="0"/>
+                <a:cs typeface="Times New Roman" panose="02020603050405020304" pitchFamily="18" charset="0"/>
+              </a:rPr>
+              <a:t>escturctura</a:t>
+            </a:r>
+            <a:r>
+              <a:rPr lang="es-MX" sz="6000" dirty="0">
+                <a:latin typeface="Times New Roman" panose="02020603050405020304" pitchFamily="18" charset="0"/>
+                <a:cs typeface="Times New Roman" panose="02020603050405020304" pitchFamily="18" charset="0"/>
+              </a:rPr>
+              <a:t>.</a:t>
+            </a:r>
+          </a:p>
+          <a:p>
+            <a:pPr algn="just"/>
+            <a:r>
+              <a:rPr lang="es-MX" sz="6000" dirty="0">
+                <a:latin typeface="Times New Roman" panose="02020603050405020304" pitchFamily="18" charset="0"/>
+                <a:cs typeface="Times New Roman" panose="02020603050405020304" pitchFamily="18" charset="0"/>
+              </a:rPr>
+              <a:t>Siempre y cuando no pensemos en realizar </a:t>
+            </a:r>
+            <a:r>
+              <a:rPr lang="es-MX" sz="6000" dirty="0" err="1">
+                <a:latin typeface="Times New Roman" panose="02020603050405020304" pitchFamily="18" charset="0"/>
+                <a:cs typeface="Times New Roman" panose="02020603050405020304" pitchFamily="18" charset="0"/>
+              </a:rPr>
+              <a:t>joins</a:t>
+            </a:r>
+            <a:r>
+              <a:rPr lang="es-MX" sz="6000" dirty="0">
+                <a:latin typeface="Times New Roman" panose="02020603050405020304" pitchFamily="18" charset="0"/>
+                <a:cs typeface="Times New Roman" panose="02020603050405020304" pitchFamily="18" charset="0"/>
+              </a:rPr>
+              <a:t>.</a:t>
+            </a:r>
+          </a:p>
+          <a:p>
+            <a:pPr algn="just"/>
+            <a:r>
+              <a:rPr lang="es-MX" sz="6000" dirty="0">
+                <a:latin typeface="Times New Roman" panose="02020603050405020304" pitchFamily="18" charset="0"/>
+                <a:cs typeface="Times New Roman" panose="02020603050405020304" pitchFamily="18" charset="0"/>
+              </a:rPr>
+              <a:t>Cuando la información sea actualizada de manera frecuente.</a:t>
+            </a:r>
+            <a:endParaRPr lang="en-US" sz="6000" dirty="0">
+              <a:latin typeface="Times New Roman" panose="02020603050405020304" pitchFamily="18" charset="0"/>
+              <a:cs typeface="Times New Roman" panose="02020603050405020304" pitchFamily="18" charset="0"/>
+            </a:endParaRPr>
+          </a:p>
         </p:txBody>
       </p:sp>
     </p:spTree>
     <p:extLst>
       <p:ext uri="{BB962C8B-B14F-4D97-AF65-F5344CB8AC3E}">
-        <p14:creationId xmlns:p14="http://schemas.microsoft.com/office/powerpoint/2010/main" val="2993715308"/>
+        <p14:creationId xmlns:p14="http://schemas.microsoft.com/office/powerpoint/2010/main" val="3862649840"/>
       </p:ext>
     </p:extLst>
   </p:cSld>
@@ -4041,6 +4523,114 @@
         </p:nvSpPr>
         <p:spPr>
           <a:xfrm>
+            <a:off x="858824" y="1016110"/>
+            <a:ext cx="7426352" cy="2472212"/>
+          </a:xfrm>
+        </p:spPr>
+        <p:txBody>
+          <a:bodyPr/>
+          <a:lstStyle/>
+          <a:p>
+            <a:pPr marL="0" indent="0" algn="ctr">
+              <a:buNone/>
+            </a:pPr>
+            <a:r>
+              <a:rPr lang="en-US" b="1" dirty="0">
+                <a:latin typeface="Times New Roman" panose="02020603050405020304" pitchFamily="18" charset="0"/>
+                <a:cs typeface="Times New Roman" panose="02020603050405020304" pitchFamily="18" charset="0"/>
+              </a:rPr>
+              <a:t>¿Que es Redis?</a:t>
+            </a:r>
+          </a:p>
+          <a:p>
+            <a:pPr marL="0" indent="0">
+              <a:buNone/>
+            </a:pPr>
+            <a:endParaRPr lang="es-MX" sz="1500" dirty="0">
+              <a:latin typeface="Times New Roman" panose="02020603050405020304" pitchFamily="18" charset="0"/>
+              <a:cs typeface="Times New Roman" panose="02020603050405020304" pitchFamily="18" charset="0"/>
+            </a:endParaRPr>
+          </a:p>
+          <a:p>
+            <a:pPr marL="0" indent="0">
+              <a:buNone/>
+            </a:pPr>
+            <a:endParaRPr lang="es-MX" sz="1500" dirty="0">
+              <a:latin typeface="Times New Roman" panose="02020603050405020304" pitchFamily="18" charset="0"/>
+              <a:cs typeface="Times New Roman" panose="02020603050405020304" pitchFamily="18" charset="0"/>
+            </a:endParaRPr>
+          </a:p>
+          <a:p>
+            <a:pPr marL="0" indent="0">
+              <a:buNone/>
+            </a:pPr>
+            <a:r>
+              <a:rPr lang="es-MX" sz="1500" dirty="0">
+                <a:latin typeface="Times New Roman" panose="02020603050405020304" pitchFamily="18" charset="0"/>
+                <a:cs typeface="Times New Roman" panose="02020603050405020304" pitchFamily="18" charset="0"/>
+              </a:rPr>
+              <a:t>Redis es un motor de base de datos en memoria, basado en el almacenamiento en tablas de hashes (clave/valor) pero que opcionalmente puede ser usada como una base de datos durable o persistente. Su importante característica permite reutilizar datos guardados en la caché, lo cual permite obtener esta información mucho más rápido que ir hasta el disco duro.</a:t>
+            </a:r>
+            <a:endParaRPr lang="en-US" sz="1500" dirty="0">
+              <a:latin typeface="Times New Roman" panose="02020603050405020304" pitchFamily="18" charset="0"/>
+              <a:cs typeface="Times New Roman" panose="02020603050405020304" pitchFamily="18" charset="0"/>
+            </a:endParaRPr>
+          </a:p>
+        </p:txBody>
+      </p:sp>
+    </p:spTree>
+    <p:extLst>
+      <p:ext uri="{BB962C8B-B14F-4D97-AF65-F5344CB8AC3E}">
+        <p14:creationId xmlns:p14="http://schemas.microsoft.com/office/powerpoint/2010/main" val="2993715308"/>
+      </p:ext>
+    </p:extLst>
+  </p:cSld>
+  <p:clrMapOvr>
+    <a:masterClrMapping/>
+  </p:clrMapOvr>
+</p:sld>
+</file>
+
+<file path=ppt/slides/slide7.xml><?xml version="1.0" encoding="utf-8"?>
+<p:sld xmlns:a="http://schemas.openxmlformats.org/drawingml/2006/main" xmlns:r="http://schemas.openxmlformats.org/officeDocument/2006/relationships" xmlns:p="http://schemas.openxmlformats.org/presentationml/2006/main">
+  <p:cSld>
+    <p:bg>
+      <p:bgPr>
+        <a:blipFill rotWithShape="1">
+          <a:blip r:embed="rId2"/>
+          <a:stretch>
+            <a:fillRect/>
+          </a:stretch>
+        </a:blipFill>
+        <a:effectLst/>
+      </p:bgPr>
+    </p:bg>
+    <p:spTree>
+      <p:nvGrpSpPr>
+        <p:cNvPr id="1" name=""/>
+        <p:cNvGrpSpPr/>
+        <p:nvPr/>
+      </p:nvGrpSpPr>
+      <p:grpSpPr>
+        <a:xfrm>
+          <a:off x="0" y="0"/>
+          <a:ext cx="0" cy="0"/>
+          <a:chOff x="0" y="0"/>
+          <a:chExt cx="0" cy="0"/>
+        </a:xfrm>
+      </p:grpSpPr>
+      <p:sp>
+        <p:nvSpPr>
+          <p:cNvPr id="4" name="Content Placeholder 2"/>
+          <p:cNvSpPr>
+            <a:spLocks noGrp="1"/>
+          </p:cNvSpPr>
+          <p:nvPr>
+            <p:ph idx="1"/>
+          </p:nvPr>
+        </p:nvSpPr>
+        <p:spPr>
+          <a:xfrm>
             <a:off x="1129758" y="880643"/>
             <a:ext cx="7426352" cy="2472212"/>
           </a:xfrm>
@@ -4061,6 +4651,15 @@
               </a:rPr>
               <a:t>¿Cuándo usar Redis?</a:t>
             </a:r>
+          </a:p>
+          <a:p>
+            <a:pPr marL="0" indent="0" algn="just">
+              <a:buNone/>
+            </a:pPr>
+            <a:endParaRPr lang="es-MX" sz="6000" dirty="0">
+              <a:latin typeface="Times New Roman" panose="02020603050405020304" pitchFamily="18" charset="0"/>
+              <a:cs typeface="Times New Roman" panose="02020603050405020304" pitchFamily="18" charset="0"/>
+            </a:endParaRPr>
           </a:p>
           <a:p>
             <a:pPr marL="0" indent="0" algn="just">
@@ -4162,7 +4761,106 @@
 </p:sld>
 </file>
 
-<file path=ppt/slides/slide7.xml><?xml version="1.0" encoding="utf-8"?>
+<file path=ppt/slides/slide8.xml><?xml version="1.0" encoding="utf-8"?>
+<p:sld xmlns:a="http://schemas.openxmlformats.org/drawingml/2006/main" xmlns:r="http://schemas.openxmlformats.org/officeDocument/2006/relationships" xmlns:p="http://schemas.openxmlformats.org/presentationml/2006/main">
+  <p:cSld>
+    <p:bg>
+      <p:bgPr>
+        <a:blipFill rotWithShape="1">
+          <a:blip r:embed="rId2"/>
+          <a:stretch>
+            <a:fillRect/>
+          </a:stretch>
+        </a:blipFill>
+        <a:effectLst/>
+      </p:bgPr>
+    </p:bg>
+    <p:spTree>
+      <p:nvGrpSpPr>
+        <p:cNvPr id="1" name=""/>
+        <p:cNvGrpSpPr/>
+        <p:nvPr/>
+      </p:nvGrpSpPr>
+      <p:grpSpPr>
+        <a:xfrm>
+          <a:off x="0" y="0"/>
+          <a:ext cx="0" cy="0"/>
+          <a:chOff x="0" y="0"/>
+          <a:chExt cx="0" cy="0"/>
+        </a:xfrm>
+      </p:grpSpPr>
+      <p:sp>
+        <p:nvSpPr>
+          <p:cNvPr id="4" name="Content Placeholder 2"/>
+          <p:cNvSpPr>
+            <a:spLocks noGrp="1"/>
+          </p:cNvSpPr>
+          <p:nvPr>
+            <p:ph idx="1"/>
+          </p:nvPr>
+        </p:nvSpPr>
+        <p:spPr>
+          <a:xfrm>
+            <a:off x="1079308" y="1709910"/>
+            <a:ext cx="7426352" cy="1345448"/>
+          </a:xfrm>
+        </p:spPr>
+        <p:txBody>
+          <a:bodyPr>
+            <a:normAutofit/>
+          </a:bodyPr>
+          <a:lstStyle/>
+          <a:p>
+            <a:pPr marL="0" indent="0" algn="ctr">
+              <a:buNone/>
+            </a:pPr>
+            <a:r>
+              <a:rPr lang="es-MX" b="1" dirty="0">
+                <a:latin typeface="Times New Roman" panose="02020603050405020304" pitchFamily="18" charset="0"/>
+                <a:cs typeface="Times New Roman" panose="02020603050405020304" pitchFamily="18" charset="0"/>
+              </a:rPr>
+              <a:t>Ejemplo</a:t>
+            </a:r>
+            <a:r>
+              <a:rPr lang="es-MX" sz="5100" b="1" dirty="0">
+                <a:latin typeface="Times New Roman" panose="02020603050405020304" pitchFamily="18" charset="0"/>
+                <a:cs typeface="Times New Roman" panose="02020603050405020304" pitchFamily="18" charset="0"/>
+              </a:rPr>
+              <a:t> </a:t>
+            </a:r>
+            <a:r>
+              <a:rPr lang="es-MX" b="1" dirty="0">
+                <a:latin typeface="Times New Roman" panose="02020603050405020304" pitchFamily="18" charset="0"/>
+                <a:cs typeface="Times New Roman" panose="02020603050405020304" pitchFamily="18" charset="0"/>
+              </a:rPr>
+              <a:t>práctico</a:t>
+            </a:r>
+          </a:p>
+          <a:p>
+            <a:pPr marL="0" indent="0" algn="just">
+              <a:buNone/>
+            </a:pPr>
+            <a:endParaRPr lang="es-MX" sz="6000" dirty="0">
+              <a:latin typeface="Times New Roman" panose="02020603050405020304" pitchFamily="18" charset="0"/>
+              <a:cs typeface="Times New Roman" panose="02020603050405020304" pitchFamily="18" charset="0"/>
+            </a:endParaRPr>
+          </a:p>
+        </p:txBody>
+      </p:sp>
+    </p:spTree>
+    <p:extLst>
+      <p:ext uri="{BB962C8B-B14F-4D97-AF65-F5344CB8AC3E}">
+        <p14:creationId xmlns:p14="http://schemas.microsoft.com/office/powerpoint/2010/main" val="2794655911"/>
+      </p:ext>
+    </p:extLst>
+  </p:cSld>
+  <p:clrMapOvr>
+    <a:masterClrMapping/>
+  </p:clrMapOvr>
+</p:sld>
+</file>
+
+<file path=ppt/slides/slide9.xml><?xml version="1.0" encoding="utf-8"?>
 <p:sld xmlns:a="http://schemas.openxmlformats.org/drawingml/2006/main" xmlns:r="http://schemas.openxmlformats.org/officeDocument/2006/relationships" xmlns:p="http://schemas.openxmlformats.org/presentationml/2006/main">
   <p:cSld>
     <p:bg>
@@ -4323,259 +5021,6 @@
     <p:extLst>
       <p:ext uri="{BB962C8B-B14F-4D97-AF65-F5344CB8AC3E}">
         <p14:creationId xmlns:p14="http://schemas.microsoft.com/office/powerpoint/2010/main" val="1156495564"/>
-      </p:ext>
-    </p:extLst>
-  </p:cSld>
-  <p:clrMapOvr>
-    <a:masterClrMapping/>
-  </p:clrMapOvr>
-</p:sld>
-</file>
-
-<file path=ppt/slides/slide8.xml><?xml version="1.0" encoding="utf-8"?>
-<p:sld xmlns:a="http://schemas.openxmlformats.org/drawingml/2006/main" xmlns:r="http://schemas.openxmlformats.org/officeDocument/2006/relationships" xmlns:p="http://schemas.openxmlformats.org/presentationml/2006/main">
-  <p:cSld>
-    <p:bg>
-      <p:bgPr>
-        <a:blipFill rotWithShape="1">
-          <a:blip r:embed="rId2"/>
-          <a:stretch>
-            <a:fillRect/>
-          </a:stretch>
-        </a:blipFill>
-        <a:effectLst/>
-      </p:bgPr>
-    </p:bg>
-    <p:spTree>
-      <p:nvGrpSpPr>
-        <p:cNvPr id="1" name=""/>
-        <p:cNvGrpSpPr/>
-        <p:nvPr/>
-      </p:nvGrpSpPr>
-      <p:grpSpPr>
-        <a:xfrm>
-          <a:off x="0" y="0"/>
-          <a:ext cx="0" cy="0"/>
-          <a:chOff x="0" y="0"/>
-          <a:chExt cx="0" cy="0"/>
-        </a:xfrm>
-      </p:grpSpPr>
-      <p:sp>
-        <p:nvSpPr>
-          <p:cNvPr id="4" name="Content Placeholder 2"/>
-          <p:cNvSpPr>
-            <a:spLocks noGrp="1"/>
-          </p:cNvSpPr>
-          <p:nvPr>
-            <p:ph idx="1"/>
-          </p:nvPr>
-        </p:nvSpPr>
-        <p:spPr>
-          <a:xfrm>
-            <a:off x="495221" y="388239"/>
-            <a:ext cx="7599376" cy="3424914"/>
-          </a:xfrm>
-        </p:spPr>
-        <p:txBody>
-          <a:bodyPr>
-            <a:normAutofit/>
-          </a:bodyPr>
-          <a:lstStyle/>
-          <a:p>
-            <a:pPr marL="0" indent="0" algn="ctr">
-              <a:buNone/>
-            </a:pPr>
-            <a:r>
-              <a:rPr lang="es-ES" dirty="0">
-                <a:latin typeface="Times New Roman" panose="02020603050405020304" pitchFamily="18" charset="0"/>
-                <a:cs typeface="Times New Roman" panose="02020603050405020304" pitchFamily="18" charset="0"/>
-              </a:rPr>
-              <a:t>Creación Imagen Redis</a:t>
-            </a:r>
-          </a:p>
-          <a:p>
-            <a:pPr marL="0" indent="0" algn="ctr">
-              <a:buNone/>
-            </a:pPr>
-            <a:endParaRPr lang="es-ES" sz="1500" dirty="0">
-              <a:latin typeface="Times New Roman" panose="02020603050405020304" pitchFamily="18" charset="0"/>
-              <a:cs typeface="Times New Roman" panose="02020603050405020304" pitchFamily="18" charset="0"/>
-            </a:endParaRPr>
-          </a:p>
-          <a:p>
-            <a:pPr marL="0" indent="0" algn="ctr">
-              <a:buNone/>
-            </a:pPr>
-            <a:r>
-              <a:rPr lang="es-ES" sz="1500" dirty="0">
-                <a:latin typeface="Times New Roman" panose="02020603050405020304" pitchFamily="18" charset="0"/>
-                <a:cs typeface="Times New Roman" panose="02020603050405020304" pitchFamily="18" charset="0"/>
-              </a:rPr>
-              <a:t>Tipo archivo: </a:t>
-            </a:r>
-            <a:r>
-              <a:rPr lang="es-ES" sz="1500" dirty="0" err="1">
-                <a:latin typeface="Times New Roman" panose="02020603050405020304" pitchFamily="18" charset="0"/>
-                <a:cs typeface="Times New Roman" panose="02020603050405020304" pitchFamily="18" charset="0"/>
-              </a:rPr>
-              <a:t>docker-compose.yml</a:t>
-            </a:r>
-            <a:endParaRPr lang="en-US" sz="1500" dirty="0">
-              <a:latin typeface="Times New Roman" panose="02020603050405020304" pitchFamily="18" charset="0"/>
-              <a:cs typeface="Times New Roman" panose="02020603050405020304" pitchFamily="18" charset="0"/>
-            </a:endParaRPr>
-          </a:p>
-        </p:txBody>
-      </p:sp>
-      <p:pic>
-        <p:nvPicPr>
-          <p:cNvPr id="5" name="Imagen 4">
-            <a:extLst>
-              <a:ext uri="{FF2B5EF4-FFF2-40B4-BE49-F238E27FC236}">
-                <a16:creationId xmlns:a16="http://schemas.microsoft.com/office/drawing/2014/main" id="{AD1EC855-FBB1-4269-802B-51318E351B18}"/>
-              </a:ext>
-            </a:extLst>
-          </p:cNvPr>
-          <p:cNvPicPr>
-            <a:picLocks noChangeAspect="1"/>
-          </p:cNvPicPr>
-          <p:nvPr/>
-        </p:nvPicPr>
-        <p:blipFill>
-          <a:blip r:embed="rId3"/>
-          <a:stretch>
-            <a:fillRect/>
-          </a:stretch>
-        </p:blipFill>
-        <p:spPr>
-          <a:xfrm>
-            <a:off x="2452996" y="1697024"/>
-            <a:ext cx="4238007" cy="2688628"/>
-          </a:xfrm>
-          <a:prstGeom prst="rect">
-            <a:avLst/>
-          </a:prstGeom>
-        </p:spPr>
-      </p:pic>
-    </p:spTree>
-    <p:extLst>
-      <p:ext uri="{BB962C8B-B14F-4D97-AF65-F5344CB8AC3E}">
-        <p14:creationId xmlns:p14="http://schemas.microsoft.com/office/powerpoint/2010/main" val="319696611"/>
-      </p:ext>
-    </p:extLst>
-  </p:cSld>
-  <p:clrMapOvr>
-    <a:masterClrMapping/>
-  </p:clrMapOvr>
-</p:sld>
-</file>
-
-<file path=ppt/slides/slide9.xml><?xml version="1.0" encoding="utf-8"?>
-<p:sld xmlns:a="http://schemas.openxmlformats.org/drawingml/2006/main" xmlns:r="http://schemas.openxmlformats.org/officeDocument/2006/relationships" xmlns:p="http://schemas.openxmlformats.org/presentationml/2006/main">
-  <p:cSld>
-    <p:bg>
-      <p:bgPr>
-        <a:blipFill rotWithShape="1">
-          <a:blip r:embed="rId2"/>
-          <a:stretch>
-            <a:fillRect/>
-          </a:stretch>
-        </a:blipFill>
-        <a:effectLst/>
-      </p:bgPr>
-    </p:bg>
-    <p:spTree>
-      <p:nvGrpSpPr>
-        <p:cNvPr id="1" name=""/>
-        <p:cNvGrpSpPr/>
-        <p:nvPr/>
-      </p:nvGrpSpPr>
-      <p:grpSpPr>
-        <a:xfrm>
-          <a:off x="0" y="0"/>
-          <a:ext cx="0" cy="0"/>
-          <a:chOff x="0" y="0"/>
-          <a:chExt cx="0" cy="0"/>
-        </a:xfrm>
-      </p:grpSpPr>
-      <p:sp>
-        <p:nvSpPr>
-          <p:cNvPr id="4" name="Content Placeholder 2"/>
-          <p:cNvSpPr>
-            <a:spLocks noGrp="1"/>
-          </p:cNvSpPr>
-          <p:nvPr>
-            <p:ph idx="1"/>
-          </p:nvPr>
-        </p:nvSpPr>
-        <p:spPr>
-          <a:xfrm>
-            <a:off x="495221" y="654063"/>
-            <a:ext cx="7599376" cy="3424914"/>
-          </a:xfrm>
-        </p:spPr>
-        <p:txBody>
-          <a:bodyPr>
-            <a:normAutofit/>
-          </a:bodyPr>
-          <a:lstStyle/>
-          <a:p>
-            <a:pPr marL="0" indent="0" algn="ctr">
-              <a:buNone/>
-            </a:pPr>
-            <a:r>
-              <a:rPr lang="es-ES" dirty="0">
-                <a:latin typeface="Times New Roman" panose="02020603050405020304" pitchFamily="18" charset="0"/>
-                <a:cs typeface="Times New Roman" panose="02020603050405020304" pitchFamily="18" charset="0"/>
-              </a:rPr>
-              <a:t>Conexión a la Base de datos</a:t>
-            </a:r>
-          </a:p>
-          <a:p>
-            <a:pPr marL="0" indent="0" algn="ctr">
-              <a:buNone/>
-            </a:pPr>
-            <a:endParaRPr lang="es-ES" sz="1500" dirty="0">
-              <a:latin typeface="Times New Roman" panose="02020603050405020304" pitchFamily="18" charset="0"/>
-              <a:cs typeface="Times New Roman" panose="02020603050405020304" pitchFamily="18" charset="0"/>
-            </a:endParaRPr>
-          </a:p>
-        </p:txBody>
-      </p:sp>
-      <p:pic>
-        <p:nvPicPr>
-          <p:cNvPr id="3" name="Imagen 2">
-            <a:extLst>
-              <a:ext uri="{FF2B5EF4-FFF2-40B4-BE49-F238E27FC236}">
-                <a16:creationId xmlns:a16="http://schemas.microsoft.com/office/drawing/2014/main" id="{6EDAF813-D541-4879-87B9-8E31891B6F4D}"/>
-              </a:ext>
-            </a:extLst>
-          </p:cNvPr>
-          <p:cNvPicPr>
-            <a:picLocks noChangeAspect="1"/>
-          </p:cNvPicPr>
-          <p:nvPr/>
-        </p:nvPicPr>
-        <p:blipFill>
-          <a:blip r:embed="rId3"/>
-          <a:stretch>
-            <a:fillRect/>
-          </a:stretch>
-        </p:blipFill>
-        <p:spPr>
-          <a:xfrm>
-            <a:off x="2305305" y="1392203"/>
-            <a:ext cx="3997774" cy="3136465"/>
-          </a:xfrm>
-          <a:prstGeom prst="rect">
-            <a:avLst/>
-          </a:prstGeom>
-        </p:spPr>
-      </p:pic>
-    </p:spTree>
-    <p:extLst>
-      <p:ext uri="{BB962C8B-B14F-4D97-AF65-F5344CB8AC3E}">
-        <p14:creationId xmlns:p14="http://schemas.microsoft.com/office/powerpoint/2010/main" val="1223978356"/>
       </p:ext>
     </p:extLst>
   </p:cSld>

</xml_diff>